<commit_message>
Update session 39 documents.
</commit_message>
<xml_diff>
--- a/CPSC-24700/Presentations/session-39.pptx
+++ b/CPSC-24700/Presentations/session-39.pptx
@@ -121,6 +121,10 @@
     </p:ext>
   </p:extLst>
 </p:presentation>
+</file>
+
+<file path=ppt/revisionInfo.xml><?xml version="1.0" encoding="utf-8"?>
+<p1510:revInfo xmlns:a="http://schemas.openxmlformats.org/drawingml/2006/main" xmlns:r="http://schemas.openxmlformats.org/officeDocument/2006/relationships" xmlns:p1510="http://schemas.microsoft.com/office/powerpoint/2015/10/main"/>
 </file>
 
 <file path=ppt/notesMasters/notesMaster1.xml><?xml version="1.0" encoding="utf-8"?>
@@ -5143,7 +5147,7 @@
           <a:p>
             <a:r>
               <a:rPr lang="en-US" sz="3600" dirty="0"/>
-              <a:t>Assignment by Monday, Dec 4</a:t>
+              <a:t>Assignment by Wednesday, Dec 6</a:t>
             </a:r>
           </a:p>
         </p:txBody>
@@ -5191,19 +5195,25 @@
           <a:p>
             <a:r>
               <a:rPr lang="en-US" sz="2000" dirty="0"/>
-              <a:t>Continue to focus on Project 5… which is due one week from today</a:t>
-            </a:r>
-          </a:p>
-          <a:p>
-            <a:r>
-              <a:rPr lang="en-US" sz="2000" dirty="0"/>
-              <a:t>Cloud Computing and MapReduce</a:t>
+              <a:t>Verify the you can access Final Exam Study Guide… let’s do that now</a:t>
             </a:r>
           </a:p>
           <a:p>
             <a:r>
               <a:rPr lang="en-US" sz="2000" dirty="0"/>
               <a:t>Signup for a Project 5 review timeslot for Friday… if you are not already presenting in class</a:t>
+            </a:r>
+          </a:p>
+          <a:p>
+            <a:r>
+              <a:rPr lang="en-US" sz="2000" dirty="0"/>
+              <a:t>Continue to focus on Project 5… which is due one week from today</a:t>
+            </a:r>
+          </a:p>
+          <a:p>
+            <a:r>
+              <a:rPr lang="en-US" sz="2000" dirty="0"/>
+              <a:t>Review Cloud Computing and MapReduce slides</a:t>
             </a:r>
           </a:p>
           <a:p>

</xml_diff>